<commit_message>
Added a new homework task
</commit_message>
<xml_diff>
--- a/12-Algorithms.pptx
+++ b/12-Algorithms.pptx
@@ -5,7 +5,7 @@
     <p:sldMasterId id="2147483648" r:id="rId1"/>
   </p:sldMasterIdLst>
   <p:notesMasterIdLst>
-    <p:notesMasterId r:id="rId26"/>
+    <p:notesMasterId r:id="rId27"/>
   </p:notesMasterIdLst>
   <p:sldIdLst>
     <p:sldId id="256" r:id="rId2"/>
@@ -31,7 +31,8 @@
     <p:sldId id="462" r:id="rId22"/>
     <p:sldId id="459" r:id="rId23"/>
     <p:sldId id="268" r:id="rId24"/>
-    <p:sldId id="453" r:id="rId25"/>
+    <p:sldId id="470" r:id="rId25"/>
+    <p:sldId id="453" r:id="rId26"/>
   </p:sldIdLst>
   <p:sldSz cx="9144000" cy="6858000" type="screen4x3"/>
   <p:notesSz cx="6858000" cy="9144000"/>
@@ -3833,15 +3834,7 @@
                   <a:schemeClr val="accent6"/>
                 </a:solidFill>
               </a:rPr>
-              <a:t>Алгоритъм за двоично </a:t>
-            </a:r>
-            <a:r>
-              <a:rPr lang="bg-BG" dirty="0" smtClean="0">
-                <a:solidFill>
-                  <a:schemeClr val="accent6"/>
-                </a:solidFill>
-              </a:rPr>
-              <a:t>търсене</a:t>
+              <a:t>Алгоритъм за двоично търсене</a:t>
             </a:r>
             <a:r>
               <a:rPr lang="en-US" dirty="0" smtClean="0">
@@ -4237,23 +4230,27 @@
                   </a:schemeClr>
                 </a:solidFill>
               </a:rPr>
-              <a:t>която приема масив от 10 числа. След това програмата приема 1 число.</a:t>
-            </a:r>
-          </a:p>
-          <a:p>
-            <a:pPr>
-              <a:buFont typeface="Wingdings" panose="05000000000000000000" pitchFamily="2" charset="2"/>
-              <a:buChar char="§"/>
-            </a:pPr>
-            <a:r>
-              <a:rPr lang="ru-RU" sz="2800" dirty="0">
+              <a:t>която приема масив от 10 числа. След това програмата приема 1 </a:t>
+            </a:r>
+            <a:r>
+              <a:rPr lang="ru-RU" sz="2800" dirty="0" smtClean="0">
                 <a:solidFill>
                   <a:schemeClr val="bg1">
                     <a:lumMod val="95000"/>
                   </a:schemeClr>
                 </a:solidFill>
               </a:rPr>
-              <a:t>Ако числото фигурира в </a:t>
+              <a:t>число. Ако </a:t>
+            </a:r>
+            <a:r>
+              <a:rPr lang="ru-RU" sz="2800" dirty="0">
+                <a:solidFill>
+                  <a:schemeClr val="bg1">
+                    <a:lumMod val="95000"/>
+                  </a:schemeClr>
+                </a:solidFill>
+              </a:rPr>
+              <a:t>числото фигурира в </a:t>
             </a:r>
             <a:r>
               <a:rPr lang="ru-RU" sz="2800" dirty="0" smtClean="0">
@@ -4344,15 +4341,7 @@
                   <a:schemeClr val="accent6"/>
                 </a:solidFill>
               </a:rPr>
-              <a:t>Сортиране чрез пряка </a:t>
-            </a:r>
-            <a:r>
-              <a:rPr lang="bg-BG" dirty="0" smtClean="0">
-                <a:solidFill>
-                  <a:schemeClr val="accent6"/>
-                </a:solidFill>
-              </a:rPr>
-              <a:t>селекция</a:t>
+              <a:t>Сортиране чрез пряка селекция</a:t>
             </a:r>
             <a:r>
               <a:rPr lang="en-US" dirty="0" smtClean="0">
@@ -4860,15 +4849,7 @@
                   <a:schemeClr val="accent6"/>
                 </a:solidFill>
               </a:rPr>
-              <a:t>Демо </a:t>
-            </a:r>
-            <a:r>
-              <a:rPr lang="bg-BG" dirty="0" smtClean="0">
-                <a:solidFill>
-                  <a:schemeClr val="accent6"/>
-                </a:solidFill>
-              </a:rPr>
-              <a:t>– Бързо сортиране</a:t>
+              <a:t>Демо – Бързо сортиране</a:t>
             </a:r>
             <a:endParaRPr lang="bg-BG" dirty="0">
               <a:solidFill>
@@ -4937,15 +4918,7 @@
               <a:srgbClr val="FFFFFF"/>
             </a:contourClr>
           </a:sp3d>
-          <a:extLst>
-            <a:ext uri="{909E8E84-426E-40DD-AFC4-6F175D3DCCD1}">
-              <a14:hiddenFill xmlns:a14="http://schemas.microsoft.com/office/drawing/2010/main">
-                <a:solidFill>
-                  <a:srgbClr val="FFFFFF"/>
-                </a:solidFill>
-              </a14:hiddenFill>
-            </a:ext>
-          </a:extLst>
+          <a:extLst/>
         </p:spPr>
       </p:pic>
     </p:spTree>
@@ -5078,23 +5051,57 @@
                   </a:schemeClr>
                 </a:solidFill>
               </a:rPr>
-              <a:t>която приема 10 числа и ги сортира</a:t>
-            </a:r>
-          </a:p>
-          <a:p>
-            <a:pPr>
-              <a:buFont typeface="Wingdings" panose="05000000000000000000" pitchFamily="2" charset="2"/>
-              <a:buChar char="§"/>
-            </a:pPr>
-            <a:r>
-              <a:rPr lang="ru-RU" sz="2800" dirty="0">
+              <a:t>която приема 10 числа и ги </a:t>
+            </a:r>
+            <a:r>
+              <a:rPr lang="ru-RU" sz="2800" dirty="0" smtClean="0">
                 <a:solidFill>
                   <a:schemeClr val="bg1">
                     <a:lumMod val="95000"/>
                   </a:schemeClr>
                 </a:solidFill>
               </a:rPr>
-              <a:t>Използвайте различни алгоритми за сортиране</a:t>
+              <a:t>сортира</a:t>
+            </a:r>
+            <a:r>
+              <a:rPr lang="en-US" sz="2800" dirty="0" smtClean="0">
+                <a:solidFill>
+                  <a:schemeClr val="bg1">
+                    <a:lumMod val="95000"/>
+                  </a:schemeClr>
+                </a:solidFill>
+              </a:rPr>
+              <a:t> </a:t>
+            </a:r>
+            <a:r>
+              <a:rPr lang="bg-BG" sz="2800" dirty="0">
+                <a:solidFill>
+                  <a:schemeClr val="bg1">
+                    <a:lumMod val="95000"/>
+                  </a:schemeClr>
+                </a:solidFill>
+              </a:rPr>
+              <a:t>и</a:t>
+            </a:r>
+            <a:r>
+              <a:rPr lang="ru-RU" sz="2800" dirty="0" smtClean="0">
+                <a:solidFill>
+                  <a:schemeClr val="bg1">
+                    <a:lumMod val="95000"/>
+                  </a:schemeClr>
+                </a:solidFill>
+              </a:rPr>
+              <a:t>зползвайте </a:t>
+            </a:r>
+            <a:r>
+              <a:rPr lang="ru-RU" sz="2800" dirty="0">
+                <a:solidFill>
+                  <a:schemeClr val="bg1">
+                    <a:lumMod val="95000"/>
+                  </a:schemeClr>
+                </a:solidFill>
+              </a:rPr>
+              <a:t>различни алгоритми за сортиране</a:t>
             </a:r>
           </a:p>
         </p:txBody>
@@ -5975,6 +5982,154 @@
             <p:ph type="title"/>
           </p:nvPr>
         </p:nvSpPr>
+        <p:spPr/>
+        <p:txBody>
+          <a:bodyPr/>
+          <a:lstStyle/>
+          <a:p>
+            <a:r>
+              <a:rPr lang="bg-BG" dirty="0" smtClean="0">
+                <a:solidFill>
+                  <a:schemeClr val="accent6"/>
+                </a:solidFill>
+              </a:rPr>
+              <a:t>Полезни Връзки</a:t>
+            </a:r>
+            <a:endParaRPr lang="en-US" dirty="0">
+              <a:solidFill>
+                <a:schemeClr val="accent6"/>
+              </a:solidFill>
+            </a:endParaRPr>
+          </a:p>
+        </p:txBody>
+      </p:sp>
+      <p:sp>
+        <p:nvSpPr>
+          <p:cNvPr id="3" name="Content Placeholder 2"/>
+          <p:cNvSpPr>
+            <a:spLocks noGrp="1"/>
+          </p:cNvSpPr>
+          <p:nvPr>
+            <p:ph idx="1"/>
+          </p:nvPr>
+        </p:nvSpPr>
+        <p:spPr/>
+        <p:txBody>
+          <a:bodyPr/>
+          <a:lstStyle/>
+          <a:p>
+            <a:r>
+              <a:rPr lang="en-US" dirty="0">
+                <a:solidFill>
+                  <a:schemeClr val="tx2"/>
+                </a:solidFill>
+                <a:hlinkClick r:id="rId2"/>
+              </a:rPr>
+              <a:t>http://www.sorting-algorithms.com</a:t>
+            </a:r>
+            <a:r>
+              <a:rPr lang="en-US" dirty="0" smtClean="0">
+                <a:solidFill>
+                  <a:schemeClr val="tx2"/>
+                </a:solidFill>
+                <a:hlinkClick r:id="rId2"/>
+              </a:rPr>
+              <a:t>/</a:t>
+            </a:r>
+            <a:endParaRPr lang="bg-BG" dirty="0" smtClean="0">
+              <a:solidFill>
+                <a:schemeClr val="tx2"/>
+              </a:solidFill>
+            </a:endParaRPr>
+          </a:p>
+          <a:p>
+            <a:endParaRPr lang="bg-BG" dirty="0">
+              <a:solidFill>
+                <a:schemeClr val="tx2"/>
+              </a:solidFill>
+            </a:endParaRPr>
+          </a:p>
+          <a:p>
+            <a:r>
+              <a:rPr lang="en-US" dirty="0">
+                <a:solidFill>
+                  <a:schemeClr val="tx2"/>
+                </a:solidFill>
+                <a:hlinkClick r:id="rId3"/>
+              </a:rPr>
+              <a:t>http://visualgo.net</a:t>
+            </a:r>
+            <a:r>
+              <a:rPr lang="en-US" dirty="0" smtClean="0">
+                <a:solidFill>
+                  <a:schemeClr val="tx2"/>
+                </a:solidFill>
+                <a:hlinkClick r:id="rId3"/>
+              </a:rPr>
+              <a:t>/</a:t>
+            </a:r>
+            <a:endParaRPr lang="bg-BG" dirty="0">
+              <a:solidFill>
+                <a:schemeClr val="tx2"/>
+              </a:solidFill>
+            </a:endParaRPr>
+          </a:p>
+          <a:p>
+            <a:endParaRPr lang="bg-BG" dirty="0" smtClean="0">
+              <a:solidFill>
+                <a:schemeClr val="tx2"/>
+              </a:solidFill>
+            </a:endParaRPr>
+          </a:p>
+          <a:p>
+            <a:endParaRPr lang="en-US" dirty="0">
+              <a:solidFill>
+                <a:schemeClr val="tx2"/>
+              </a:solidFill>
+            </a:endParaRPr>
+          </a:p>
+        </p:txBody>
+      </p:sp>
+    </p:spTree>
+    <p:extLst>
+      <p:ext uri="{BB962C8B-B14F-4D97-AF65-F5344CB8AC3E}">
+        <p14:creationId xmlns:p14="http://schemas.microsoft.com/office/powerpoint/2010/main" val="9059211"/>
+      </p:ext>
+    </p:extLst>
+  </p:cSld>
+  <p:clrMapOvr>
+    <a:masterClrMapping/>
+  </p:clrMapOvr>
+</p:sld>
+</file>
+
+<file path=ppt/slides/slide25.xml><?xml version="1.0" encoding="utf-8"?>
+<p:sld xmlns:a="http://schemas.openxmlformats.org/drawingml/2006/main" xmlns:r="http://schemas.openxmlformats.org/officeDocument/2006/relationships" xmlns:p="http://schemas.openxmlformats.org/presentationml/2006/main">
+  <p:cSld>
+    <p:spTree>
+      <p:nvGrpSpPr>
+        <p:cNvPr id="1" name=""/>
+        <p:cNvGrpSpPr/>
+        <p:nvPr/>
+      </p:nvGrpSpPr>
+      <p:grpSpPr>
+        <a:xfrm>
+          <a:off x="0" y="0"/>
+          <a:ext cx="0" cy="0"/>
+          <a:chOff x="0" y="0"/>
+          <a:chExt cx="0" cy="0"/>
+        </a:xfrm>
+      </p:grpSpPr>
+      <p:sp>
+        <p:nvSpPr>
+          <p:cNvPr id="2" name="Title 1"/>
+          <p:cNvSpPr>
+            <a:spLocks noGrp="1"/>
+          </p:cNvSpPr>
+          <p:nvPr>
+            <p:ph type="title"/>
+          </p:nvPr>
+        </p:nvSpPr>
         <p:spPr>
           <a:xfrm>
             <a:off x="838200" y="685800"/>
@@ -6114,27 +6269,97 @@
                   </a:schemeClr>
                 </a:solidFill>
               </a:rPr>
-              <a:t>Направете програма, която приема 10 числа. Подредете във възходящ ред всички четни числа в масив. Подредете всички нечетни числа в </a:t>
-            </a:r>
-            <a:r>
-              <a:rPr lang="ru-RU" sz="2400" dirty="0" smtClean="0">
+              <a:t>Направете програма, която приема </a:t>
+            </a:r>
+            <a:r>
+              <a:rPr lang="en-US" sz="2400" dirty="0" smtClean="0">
                 <a:solidFill>
                   <a:schemeClr val="bg1">
                     <a:lumMod val="95000"/>
                   </a:schemeClr>
                 </a:solidFill>
               </a:rPr>
-              <a:t>низходящ </a:t>
-            </a:r>
-            <a:r>
-              <a:rPr lang="ru-RU" sz="2400" dirty="0">
+              <a:t>N</a:t>
+            </a:r>
+            <a:r>
+              <a:rPr lang="ru-RU" sz="2400" dirty="0" smtClean="0">
                 <a:solidFill>
                   <a:schemeClr val="bg1">
                     <a:lumMod val="95000"/>
                   </a:schemeClr>
                 </a:solidFill>
               </a:rPr>
-              <a:t>ред в друг масив</a:t>
+              <a:t> </a:t>
+            </a:r>
+            <a:r>
+              <a:rPr lang="ru-RU" sz="2400" dirty="0">
+                <a:solidFill>
+                  <a:schemeClr val="bg1">
+                    <a:lumMod val="95000"/>
+                  </a:schemeClr>
+                </a:solidFill>
+              </a:rPr>
+              <a:t>числа. Подредете във възходящ ред всички четни числа в масив. Подредете всички нечетни числа в </a:t>
+            </a:r>
+            <a:r>
+              <a:rPr lang="ru-RU" sz="2400" dirty="0" smtClean="0">
+                <a:solidFill>
+                  <a:schemeClr val="bg1">
+                    <a:lumMod val="95000"/>
+                  </a:schemeClr>
+                </a:solidFill>
+              </a:rPr>
+              <a:t>низходящ </a:t>
+            </a:r>
+            <a:r>
+              <a:rPr lang="ru-RU" sz="2400" dirty="0">
+                <a:solidFill>
+                  <a:schemeClr val="bg1">
+                    <a:lumMod val="95000"/>
+                  </a:schemeClr>
+                </a:solidFill>
+              </a:rPr>
+              <a:t>ред в друг </a:t>
+            </a:r>
+            <a:r>
+              <a:rPr lang="ru-RU" sz="2400" dirty="0" smtClean="0">
+                <a:solidFill>
+                  <a:schemeClr val="bg1">
+                    <a:lumMod val="95000"/>
+                  </a:schemeClr>
+                </a:solidFill>
+              </a:rPr>
+              <a:t>масив</a:t>
+            </a:r>
+            <a:r>
+              <a:rPr lang="en-US" sz="2400" dirty="0" smtClean="0">
+                <a:solidFill>
+                  <a:schemeClr val="bg1">
+                    <a:lumMod val="95000"/>
+                  </a:schemeClr>
+                </a:solidFill>
+              </a:rPr>
+              <a:t>. </a:t>
+            </a:r>
+            <a:r>
+              <a:rPr lang="bg-BG" sz="2400" smtClean="0">
+                <a:solidFill>
+                  <a:schemeClr val="bg1">
+                    <a:lumMod val="95000"/>
+                  </a:schemeClr>
+                </a:solidFill>
+              </a:rPr>
+              <a:t>Сравнете скоростта </a:t>
+            </a:r>
+            <a:r>
+              <a:rPr lang="bg-BG" sz="2400" dirty="0" smtClean="0">
+                <a:solidFill>
+                  <a:schemeClr val="bg1">
+                    <a:lumMod val="95000"/>
+                  </a:schemeClr>
+                </a:solidFill>
+              </a:rPr>
+              <a:t>на изпълнение когато се сортира големия масив, и когато се сортират 2та малки масива.</a:t>
             </a:r>
             <a:endParaRPr lang="ru-RU" sz="1800" dirty="0">
               <a:solidFill>
@@ -8998,11 +9223,6 @@
               </a:rPr>
               <a:t>Видове сложност на алгоритъм</a:t>
             </a:r>
-            <a:endParaRPr lang="bg-BG" dirty="0">
-              <a:solidFill>
-                <a:schemeClr val="accent6"/>
-              </a:solidFill>
-            </a:endParaRPr>
           </a:p>
         </p:txBody>
       </p:sp>
@@ -9163,11 +9383,6 @@
               </a:rPr>
               <a:t>За извършване на дадена операция върху N елемента са необходими брой стъпки от порядъка на log(N), където основата на логаритъма е най-често 2. Например алгоритъм със сложност O(log(N)) за N = 1 000 000 ще направи около 20 стъпки (с точност до константа). Тъй като основата на логаритъма няма съществено значение за порядъка на броя операции, тя обикновено се изпуска.</a:t>
             </a:r>
-            <a:endParaRPr lang="ru-RU" dirty="0">
-              <a:solidFill>
-                <a:schemeClr val="bg1"/>
-              </a:solidFill>
-            </a:endParaRPr>
           </a:p>
         </p:txBody>
       </p:sp>
@@ -9346,7 +9561,23 @@
                   <a:schemeClr val="bg1"/>
                 </a:solidFill>
               </a:rPr>
-              <a:t>{</a:t>
+              <a:t>{O(n^2)} - </a:t>
+            </a:r>
+            <a:r>
+              <a:rPr lang="ru-RU" dirty="0">
+                <a:solidFill>
+                  <a:schemeClr val="bg1"/>
+                </a:solidFill>
+              </a:rPr>
+              <a:t>За извършване на дадена операция са необходими от порядъка на </a:t>
+            </a:r>
+            <a:r>
+              <a:rPr lang="ru-RU" dirty="0" smtClean="0">
+                <a:solidFill>
+                  <a:schemeClr val="bg1"/>
+                </a:solidFill>
+              </a:rPr>
+              <a:t>N</a:t>
             </a:r>
             <a:r>
               <a:rPr lang="en-US" dirty="0" smtClean="0">
@@ -9354,7 +9585,31 @@
                   <a:schemeClr val="bg1"/>
                 </a:solidFill>
               </a:rPr>
-              <a:t>O(n^2)</a:t>
+              <a:t>^</a:t>
+            </a:r>
+            <a:r>
+              <a:rPr lang="ru-RU" dirty="0" smtClean="0">
+                <a:solidFill>
+                  <a:schemeClr val="bg1"/>
+                </a:solidFill>
+              </a:rPr>
+              <a:t>2 </a:t>
+            </a:r>
+            <a:r>
+              <a:rPr lang="ru-RU" dirty="0">
+                <a:solidFill>
+                  <a:schemeClr val="bg1"/>
+                </a:solidFill>
+              </a:rPr>
+              <a:t>на брой стъпки, където N характеризира обема на входните данни. Например за дадена операция върху 100 елемента са необходими 10 000 стъпки. Реално квадратична сложност имаме, когато броят стъпки е в квадратна зависимост спрямо обема на входните данни, например за N елемента стъпките могат да са от порядъка на </a:t>
+            </a:r>
+            <a:r>
+              <a:rPr lang="ru-RU" dirty="0" smtClean="0">
+                <a:solidFill>
+                  <a:schemeClr val="bg1"/>
+                </a:solidFill>
+              </a:rPr>
+              <a:t>3*N</a:t>
             </a:r>
             <a:r>
               <a:rPr lang="en-US" dirty="0" smtClean="0">
@@ -9362,7 +9617,15 @@
                   <a:schemeClr val="bg1"/>
                 </a:solidFill>
               </a:rPr>
-              <a:t>} - </a:t>
+              <a:t>^</a:t>
+            </a:r>
+            <a:r>
+              <a:rPr lang="ru-RU" dirty="0" smtClean="0">
+                <a:solidFill>
+                  <a:schemeClr val="bg1"/>
+                </a:solidFill>
+              </a:rPr>
+              <a:t>2/2</a:t>
             </a:r>
             <a:r>
               <a:rPr lang="ru-RU" dirty="0">
@@ -9370,77 +9633,8 @@
                   <a:schemeClr val="bg1"/>
                 </a:solidFill>
               </a:rPr>
-              <a:t>За извършване на дадена операция са необходими от порядъка на </a:t>
-            </a:r>
-            <a:r>
-              <a:rPr lang="ru-RU" dirty="0" smtClean="0">
-                <a:solidFill>
-                  <a:schemeClr val="bg1"/>
-                </a:solidFill>
-              </a:rPr>
-              <a:t>N</a:t>
-            </a:r>
-            <a:r>
-              <a:rPr lang="en-US" dirty="0" smtClean="0">
-                <a:solidFill>
-                  <a:schemeClr val="bg1"/>
-                </a:solidFill>
-              </a:rPr>
-              <a:t>^</a:t>
-            </a:r>
-            <a:r>
-              <a:rPr lang="ru-RU" dirty="0" smtClean="0">
-                <a:solidFill>
-                  <a:schemeClr val="bg1"/>
-                </a:solidFill>
-              </a:rPr>
-              <a:t>2 </a:t>
-            </a:r>
-            <a:r>
-              <a:rPr lang="ru-RU" dirty="0">
-                <a:solidFill>
-                  <a:schemeClr val="bg1"/>
-                </a:solidFill>
-              </a:rPr>
-              <a:t>на брой стъпки, където N характеризира обема на входните данни. Например за дадена операция върху 100 елемента са необходими 10 000 стъпки. Реално квадратична сложност имаме, когато броят стъпки е в квадратна зависимост спрямо обема на входните данни, например за N елемента стъпките могат да са от порядъка на </a:t>
-            </a:r>
-            <a:r>
-              <a:rPr lang="ru-RU" dirty="0" smtClean="0">
-                <a:solidFill>
-                  <a:schemeClr val="bg1"/>
-                </a:solidFill>
-              </a:rPr>
-              <a:t>3*N</a:t>
-            </a:r>
-            <a:r>
-              <a:rPr lang="en-US" dirty="0" smtClean="0">
-                <a:solidFill>
-                  <a:schemeClr val="bg1"/>
-                </a:solidFill>
-              </a:rPr>
-              <a:t>^</a:t>
-            </a:r>
-            <a:r>
-              <a:rPr lang="ru-RU" dirty="0" smtClean="0">
-                <a:solidFill>
-                  <a:schemeClr val="bg1"/>
-                </a:solidFill>
-              </a:rPr>
-              <a:t>2/2</a:t>
-            </a:r>
-            <a:r>
-              <a:rPr lang="ru-RU" dirty="0">
-                <a:solidFill>
-                  <a:schemeClr val="bg1"/>
-                </a:solidFill>
-              </a:rPr>
               <a:t>.</a:t>
             </a:r>
-            <a:endParaRPr lang="ru-RU" dirty="0">
-              <a:solidFill>
-                <a:schemeClr val="bg1"/>
-              </a:solidFill>
-            </a:endParaRPr>
           </a:p>
         </p:txBody>
       </p:sp>
@@ -9619,15 +9813,31 @@
                   <a:schemeClr val="bg1"/>
                 </a:solidFill>
               </a:rPr>
-              <a:t>кспоненциална </a:t>
-            </a:r>
-            <a:r>
-              <a:rPr lang="bg-BG" dirty="0" smtClean="0">
+              <a:t>кспоненциална  </a:t>
+            </a:r>
+            <a:r>
+              <a:rPr lang="en-US" dirty="0" smtClean="0">
                 <a:solidFill>
                   <a:schemeClr val="bg1"/>
                 </a:solidFill>
               </a:rPr>
-              <a:t> </a:t>
+              <a:t>{O(2^n), O(N!), O(</a:t>
+            </a:r>
+            <a:r>
+              <a:rPr lang="en-US" dirty="0" err="1">
+                <a:solidFill>
+                  <a:schemeClr val="bg1"/>
+                </a:solidFill>
+              </a:rPr>
+              <a:t>n</a:t>
+            </a:r>
+            <a:r>
+              <a:rPr lang="en-US" dirty="0" err="1" smtClean="0">
+                <a:solidFill>
+                  <a:schemeClr val="bg1"/>
+                </a:solidFill>
+              </a:rPr>
+              <a:t>^k</a:t>
             </a:r>
             <a:r>
               <a:rPr lang="en-US" dirty="0" smtClean="0">
@@ -9635,61 +9845,16 @@
                   <a:schemeClr val="bg1"/>
                 </a:solidFill>
               </a:rPr>
-              <a:t>{</a:t>
-            </a:r>
-            <a:r>
-              <a:rPr lang="en-US" dirty="0" smtClean="0">
+              <a:t>)} - </a:t>
+            </a:r>
+            <a:r>
+              <a:rPr lang="ru-RU" dirty="0">
                 <a:solidFill>
                   <a:schemeClr val="bg1"/>
                 </a:solidFill>
               </a:rPr>
-              <a:t>O(2^n), O(N!), O(</a:t>
-            </a:r>
-            <a:r>
-              <a:rPr lang="en-US" dirty="0" err="1">
-                <a:solidFill>
-                  <a:schemeClr val="bg1"/>
-                </a:solidFill>
-              </a:rPr>
-              <a:t>n</a:t>
-            </a:r>
-            <a:r>
-              <a:rPr lang="en-US" dirty="0" err="1" smtClean="0">
-                <a:solidFill>
-                  <a:schemeClr val="bg1"/>
-                </a:solidFill>
-              </a:rPr>
-              <a:t>^k</a:t>
-            </a:r>
-            <a:r>
-              <a:rPr lang="en-US" dirty="0" smtClean="0">
-                <a:solidFill>
-                  <a:schemeClr val="bg1"/>
-                </a:solidFill>
-              </a:rPr>
-              <a:t>)</a:t>
-            </a:r>
-            <a:r>
-              <a:rPr lang="en-US" dirty="0" smtClean="0">
-                <a:solidFill>
-                  <a:schemeClr val="bg1"/>
-                </a:solidFill>
-              </a:rPr>
-              <a:t>} - </a:t>
-            </a:r>
-            <a:r>
-              <a:rPr lang="ru-RU" dirty="0">
-                <a:solidFill>
-                  <a:schemeClr val="bg1"/>
-                </a:solidFill>
-              </a:rPr>
               <a:t>За извършване на дадена операция или изчисление са необходими брой стъпки, който е в експоненциална зависимост спрямо размера на входните данни. Например при N=10 експоненциалната функция 2N има стойност 1024, при N=20 има стойност 1 048 576, а при N=100 функцията има стойност, която е число с около 30 цифри. Експоненциалната функция N! расте още по-бързо: за N=5 има стойност 120, за N=10 има стойност 3 628 800, а за N=20 – 2 432 902 008 176 640 000.</a:t>
             </a:r>
-            <a:endParaRPr lang="ru-RU" dirty="0">
-              <a:solidFill>
-                <a:schemeClr val="bg1"/>
-              </a:solidFill>
-            </a:endParaRPr>
           </a:p>
         </p:txBody>
       </p:sp>

</xml_diff>